<commit_message>
Completed lab 5 for making maps
</commit_message>
<xml_diff>
--- a/capstone/assets.pptx
+++ b/capstone/assets.pptx
@@ -6,6 +6,7 @@
   </p:sldMasterIdLst>
   <p:sldIdLst>
     <p:sldId id="256" r:id="rId2"/>
+    <p:sldId id="257" r:id="rId3"/>
   </p:sldIdLst>
   <p:sldSz cx="12192000" cy="6858000"/>
   <p:notesSz cx="6858000" cy="9144000"/>
@@ -104,6 +105,11 @@
       </a:defRPr>
     </a:lvl9pPr>
   </p:defaultTextStyle>
+  <p:extLst>
+    <p:ext uri="{EFAFB233-063F-42B5-8137-9DF3F51BA10A}">
+      <p15:sldGuideLst xmlns:p15="http://schemas.microsoft.com/office/powerpoint/2012/main"/>
+    </p:ext>
+  </p:extLst>
 </p:presentation>
 </file>
 
@@ -256,7 +262,7 @@
           <a:p>
             <a:fld id="{7356150F-0F10-4D18-BDA6-A4E0A873582B}" type="datetimeFigureOut">
               <a:rPr lang="en-MY" smtClean="0"/>
-              <a:t>26/2/2018</a:t>
+              <a:t>28/2/2018</a:t>
             </a:fld>
             <a:endParaRPr lang="en-MY"/>
           </a:p>
@@ -456,7 +462,7 @@
           <a:p>
             <a:fld id="{7356150F-0F10-4D18-BDA6-A4E0A873582B}" type="datetimeFigureOut">
               <a:rPr lang="en-MY" smtClean="0"/>
-              <a:t>26/2/2018</a:t>
+              <a:t>28/2/2018</a:t>
             </a:fld>
             <a:endParaRPr lang="en-MY"/>
           </a:p>
@@ -666,7 +672,7 @@
           <a:p>
             <a:fld id="{7356150F-0F10-4D18-BDA6-A4E0A873582B}" type="datetimeFigureOut">
               <a:rPr lang="en-MY" smtClean="0"/>
-              <a:t>26/2/2018</a:t>
+              <a:t>28/2/2018</a:t>
             </a:fld>
             <a:endParaRPr lang="en-MY"/>
           </a:p>
@@ -866,7 +872,7 @@
           <a:p>
             <a:fld id="{7356150F-0F10-4D18-BDA6-A4E0A873582B}" type="datetimeFigureOut">
               <a:rPr lang="en-MY" smtClean="0"/>
-              <a:t>26/2/2018</a:t>
+              <a:t>28/2/2018</a:t>
             </a:fld>
             <a:endParaRPr lang="en-MY"/>
           </a:p>
@@ -1142,7 +1148,7 @@
           <a:p>
             <a:fld id="{7356150F-0F10-4D18-BDA6-A4E0A873582B}" type="datetimeFigureOut">
               <a:rPr lang="en-MY" smtClean="0"/>
-              <a:t>26/2/2018</a:t>
+              <a:t>28/2/2018</a:t>
             </a:fld>
             <a:endParaRPr lang="en-MY"/>
           </a:p>
@@ -1410,7 +1416,7 @@
           <a:p>
             <a:fld id="{7356150F-0F10-4D18-BDA6-A4E0A873582B}" type="datetimeFigureOut">
               <a:rPr lang="en-MY" smtClean="0"/>
-              <a:t>26/2/2018</a:t>
+              <a:t>28/2/2018</a:t>
             </a:fld>
             <a:endParaRPr lang="en-MY"/>
           </a:p>
@@ -1825,7 +1831,7 @@
           <a:p>
             <a:fld id="{7356150F-0F10-4D18-BDA6-A4E0A873582B}" type="datetimeFigureOut">
               <a:rPr lang="en-MY" smtClean="0"/>
-              <a:t>26/2/2018</a:t>
+              <a:t>28/2/2018</a:t>
             </a:fld>
             <a:endParaRPr lang="en-MY"/>
           </a:p>
@@ -1967,7 +1973,7 @@
           <a:p>
             <a:fld id="{7356150F-0F10-4D18-BDA6-A4E0A873582B}" type="datetimeFigureOut">
               <a:rPr lang="en-MY" smtClean="0"/>
-              <a:t>26/2/2018</a:t>
+              <a:t>28/2/2018</a:t>
             </a:fld>
             <a:endParaRPr lang="en-MY"/>
           </a:p>
@@ -2080,7 +2086,7 @@
           <a:p>
             <a:fld id="{7356150F-0F10-4D18-BDA6-A4E0A873582B}" type="datetimeFigureOut">
               <a:rPr lang="en-MY" smtClean="0"/>
-              <a:t>26/2/2018</a:t>
+              <a:t>28/2/2018</a:t>
             </a:fld>
             <a:endParaRPr lang="en-MY"/>
           </a:p>
@@ -2393,7 +2399,7 @@
           <a:p>
             <a:fld id="{7356150F-0F10-4D18-BDA6-A4E0A873582B}" type="datetimeFigureOut">
               <a:rPr lang="en-MY" smtClean="0"/>
-              <a:t>26/2/2018</a:t>
+              <a:t>28/2/2018</a:t>
             </a:fld>
             <a:endParaRPr lang="en-MY"/>
           </a:p>
@@ -2682,7 +2688,7 @@
           <a:p>
             <a:fld id="{7356150F-0F10-4D18-BDA6-A4E0A873582B}" type="datetimeFigureOut">
               <a:rPr lang="en-MY" smtClean="0"/>
-              <a:t>26/2/2018</a:t>
+              <a:t>28/2/2018</a:t>
             </a:fld>
             <a:endParaRPr lang="en-MY"/>
           </a:p>
@@ -2925,7 +2931,7 @@
           <a:p>
             <a:fld id="{7356150F-0F10-4D18-BDA6-A4E0A873582B}" type="datetimeFigureOut">
               <a:rPr lang="en-MY" smtClean="0"/>
-              <a:t>26/2/2018</a:t>
+              <a:t>28/2/2018</a:t>
             </a:fld>
             <a:endParaRPr lang="en-MY"/>
           </a:p>
@@ -3342,6 +3348,2159 @@
           <a:chExt cx="0" cy="0"/>
         </a:xfrm>
       </p:grpSpPr>
+      <p:grpSp>
+        <p:nvGrpSpPr>
+          <p:cNvPr id="3" name="Group 2">
+            <a:extLst>
+              <a:ext uri="{FF2B5EF4-FFF2-40B4-BE49-F238E27FC236}">
+                <a16:creationId xmlns:a16="http://schemas.microsoft.com/office/drawing/2014/main" id="{E76C182F-9DD9-4BE3-8FB9-2170FC3317FD}"/>
+              </a:ext>
+            </a:extLst>
+          </p:cNvPr>
+          <p:cNvGrpSpPr/>
+          <p:nvPr/>
+        </p:nvGrpSpPr>
+        <p:grpSpPr>
+          <a:xfrm>
+            <a:off x="894665" y="907820"/>
+            <a:ext cx="9690009" cy="5371667"/>
+            <a:chOff x="894665" y="907820"/>
+            <a:chExt cx="9690009" cy="5371667"/>
+          </a:xfrm>
+        </p:grpSpPr>
+        <p:sp>
+          <p:nvSpPr>
+            <p:cNvPr id="4" name="Rectangle 3">
+              <a:extLst>
+                <a:ext uri="{FF2B5EF4-FFF2-40B4-BE49-F238E27FC236}">
+                  <a16:creationId xmlns:a16="http://schemas.microsoft.com/office/drawing/2014/main" id="{9EF55937-DCC3-4379-9627-991098660C65}"/>
+                </a:ext>
+              </a:extLst>
+            </p:cNvPr>
+            <p:cNvSpPr/>
+            <p:nvPr/>
+          </p:nvSpPr>
+          <p:spPr>
+            <a:xfrm>
+              <a:off x="894665" y="907822"/>
+              <a:ext cx="3230003" cy="4946969"/>
+            </a:xfrm>
+            <a:prstGeom prst="rect">
+              <a:avLst/>
+            </a:prstGeom>
+            <a:noFill/>
+            <a:ln w="38100">
+              <a:solidFill>
+                <a:schemeClr val="bg2">
+                  <a:lumMod val="50000"/>
+                </a:schemeClr>
+              </a:solidFill>
+              <a:prstDash val="dash"/>
+            </a:ln>
+          </p:spPr>
+          <p:style>
+            <a:lnRef idx="2">
+              <a:schemeClr val="accent1">
+                <a:shade val="50000"/>
+              </a:schemeClr>
+            </a:lnRef>
+            <a:fillRef idx="1">
+              <a:schemeClr val="accent1"/>
+            </a:fillRef>
+            <a:effectRef idx="0">
+              <a:schemeClr val="accent1"/>
+            </a:effectRef>
+            <a:fontRef idx="minor">
+              <a:schemeClr val="lt1"/>
+            </a:fontRef>
+          </p:style>
+          <p:txBody>
+            <a:bodyPr rtlCol="0" anchor="ctr"/>
+            <a:lstStyle/>
+            <a:p>
+              <a:pPr algn="ctr"/>
+              <a:endParaRPr lang="en-MY" sz="1400">
+                <a:latin typeface="Gotham" panose="02000303000000000000" pitchFamily="50" charset="0"/>
+              </a:endParaRPr>
+            </a:p>
+          </p:txBody>
+        </p:sp>
+        <p:sp>
+          <p:nvSpPr>
+            <p:cNvPr id="5" name="Rectangle 4">
+              <a:extLst>
+                <a:ext uri="{FF2B5EF4-FFF2-40B4-BE49-F238E27FC236}">
+                  <a16:creationId xmlns:a16="http://schemas.microsoft.com/office/drawing/2014/main" id="{38399477-81A1-412B-B648-8CB43EEBED78}"/>
+                </a:ext>
+              </a:extLst>
+            </p:cNvPr>
+            <p:cNvSpPr/>
+            <p:nvPr/>
+          </p:nvSpPr>
+          <p:spPr>
+            <a:xfrm>
+              <a:off x="4124668" y="907822"/>
+              <a:ext cx="3230003" cy="4946969"/>
+            </a:xfrm>
+            <a:prstGeom prst="rect">
+              <a:avLst/>
+            </a:prstGeom>
+            <a:noFill/>
+            <a:ln w="38100">
+              <a:solidFill>
+                <a:schemeClr val="bg2">
+                  <a:lumMod val="50000"/>
+                </a:schemeClr>
+              </a:solidFill>
+              <a:prstDash val="dash"/>
+            </a:ln>
+          </p:spPr>
+          <p:style>
+            <a:lnRef idx="2">
+              <a:schemeClr val="accent1">
+                <a:shade val="50000"/>
+              </a:schemeClr>
+            </a:lnRef>
+            <a:fillRef idx="1">
+              <a:schemeClr val="accent1"/>
+            </a:fillRef>
+            <a:effectRef idx="0">
+              <a:schemeClr val="accent1"/>
+            </a:effectRef>
+            <a:fontRef idx="minor">
+              <a:schemeClr val="lt1"/>
+            </a:fontRef>
+          </p:style>
+          <p:txBody>
+            <a:bodyPr rtlCol="0" anchor="ctr"/>
+            <a:lstStyle/>
+            <a:p>
+              <a:pPr algn="ctr"/>
+              <a:endParaRPr lang="en-MY" sz="1400">
+                <a:latin typeface="Gotham" panose="02000303000000000000" pitchFamily="50" charset="0"/>
+              </a:endParaRPr>
+            </a:p>
+          </p:txBody>
+        </p:sp>
+        <p:sp>
+          <p:nvSpPr>
+            <p:cNvPr id="6" name="Rectangle 5">
+              <a:extLst>
+                <a:ext uri="{FF2B5EF4-FFF2-40B4-BE49-F238E27FC236}">
+                  <a16:creationId xmlns:a16="http://schemas.microsoft.com/office/drawing/2014/main" id="{64963F63-1170-4EC4-9B34-52203E511403}"/>
+                </a:ext>
+              </a:extLst>
+            </p:cNvPr>
+            <p:cNvSpPr/>
+            <p:nvPr/>
+          </p:nvSpPr>
+          <p:spPr>
+            <a:xfrm>
+              <a:off x="7354671" y="907821"/>
+              <a:ext cx="3230003" cy="4946969"/>
+            </a:xfrm>
+            <a:prstGeom prst="rect">
+              <a:avLst/>
+            </a:prstGeom>
+            <a:noFill/>
+            <a:ln w="38100">
+              <a:solidFill>
+                <a:schemeClr val="bg2">
+                  <a:lumMod val="50000"/>
+                </a:schemeClr>
+              </a:solidFill>
+              <a:prstDash val="dash"/>
+            </a:ln>
+          </p:spPr>
+          <p:style>
+            <a:lnRef idx="2">
+              <a:schemeClr val="accent1">
+                <a:shade val="50000"/>
+              </a:schemeClr>
+            </a:lnRef>
+            <a:fillRef idx="1">
+              <a:schemeClr val="accent1"/>
+            </a:fillRef>
+            <a:effectRef idx="0">
+              <a:schemeClr val="accent1"/>
+            </a:effectRef>
+            <a:fontRef idx="minor">
+              <a:schemeClr val="lt1"/>
+            </a:fontRef>
+          </p:style>
+          <p:txBody>
+            <a:bodyPr rtlCol="0" anchor="ctr"/>
+            <a:lstStyle/>
+            <a:p>
+              <a:pPr algn="ctr"/>
+              <a:endParaRPr lang="en-MY" sz="1400">
+                <a:latin typeface="Gotham" panose="02000303000000000000" pitchFamily="50" charset="0"/>
+              </a:endParaRPr>
+            </a:p>
+          </p:txBody>
+        </p:sp>
+        <p:sp>
+          <p:nvSpPr>
+            <p:cNvPr id="7" name="TextBox 6">
+              <a:extLst>
+                <a:ext uri="{FF2B5EF4-FFF2-40B4-BE49-F238E27FC236}">
+                  <a16:creationId xmlns:a16="http://schemas.microsoft.com/office/drawing/2014/main" id="{D2D0486F-6AF2-4AF2-8715-CDF2A2A6BCAD}"/>
+                </a:ext>
+              </a:extLst>
+            </p:cNvPr>
+            <p:cNvSpPr txBox="1"/>
+            <p:nvPr/>
+          </p:nvSpPr>
+          <p:spPr>
+            <a:xfrm>
+              <a:off x="894665" y="907821"/>
+              <a:ext cx="1071127" cy="307777"/>
+            </a:xfrm>
+            <a:prstGeom prst="rect">
+              <a:avLst/>
+            </a:prstGeom>
+            <a:noFill/>
+          </p:spPr>
+          <p:txBody>
+            <a:bodyPr wrap="none" rtlCol="0" anchor="ctr">
+              <a:spAutoFit/>
+            </a:bodyPr>
+            <a:lstStyle/>
+            <a:p>
+              <a:pPr algn="ctr"/>
+              <a:r>
+                <a:rPr lang="en-US" sz="1400" dirty="0">
+                  <a:latin typeface="Gotham" panose="02000303000000000000" pitchFamily="50" charset="0"/>
+                </a:rPr>
+                <a:t>Shipment</a:t>
+              </a:r>
+              <a:endParaRPr lang="en-MY" sz="1400" dirty="0">
+                <a:latin typeface="Gotham" panose="02000303000000000000" pitchFamily="50" charset="0"/>
+              </a:endParaRPr>
+            </a:p>
+          </p:txBody>
+        </p:sp>
+        <p:sp>
+          <p:nvSpPr>
+            <p:cNvPr id="8" name="TextBox 7">
+              <a:extLst>
+                <a:ext uri="{FF2B5EF4-FFF2-40B4-BE49-F238E27FC236}">
+                  <a16:creationId xmlns:a16="http://schemas.microsoft.com/office/drawing/2014/main" id="{B90B1E08-72C1-4C0F-8326-4D0DF53B4626}"/>
+                </a:ext>
+              </a:extLst>
+            </p:cNvPr>
+            <p:cNvSpPr txBox="1"/>
+            <p:nvPr/>
+          </p:nvSpPr>
+          <p:spPr>
+            <a:xfrm>
+              <a:off x="4124668" y="907821"/>
+              <a:ext cx="651140" cy="307777"/>
+            </a:xfrm>
+            <a:prstGeom prst="rect">
+              <a:avLst/>
+            </a:prstGeom>
+            <a:noFill/>
+          </p:spPr>
+          <p:txBody>
+            <a:bodyPr wrap="none" rtlCol="0" anchor="ctr">
+              <a:spAutoFit/>
+            </a:bodyPr>
+            <a:lstStyle/>
+            <a:p>
+              <a:pPr algn="ctr"/>
+              <a:r>
+                <a:rPr lang="en-US" sz="1400" dirty="0">
+                  <a:latin typeface="Gotham" panose="02000303000000000000" pitchFamily="50" charset="0"/>
+                </a:rPr>
+                <a:t>Load</a:t>
+              </a:r>
+              <a:endParaRPr lang="en-MY" sz="1400" dirty="0">
+                <a:latin typeface="Gotham" panose="02000303000000000000" pitchFamily="50" charset="0"/>
+              </a:endParaRPr>
+            </a:p>
+          </p:txBody>
+        </p:sp>
+        <p:sp>
+          <p:nvSpPr>
+            <p:cNvPr id="9" name="TextBox 8">
+              <a:extLst>
+                <a:ext uri="{FF2B5EF4-FFF2-40B4-BE49-F238E27FC236}">
+                  <a16:creationId xmlns:a16="http://schemas.microsoft.com/office/drawing/2014/main" id="{FAE110A0-8EA1-42E3-974A-D2E4785BBA08}"/>
+                </a:ext>
+              </a:extLst>
+            </p:cNvPr>
+            <p:cNvSpPr txBox="1"/>
+            <p:nvPr/>
+          </p:nvSpPr>
+          <p:spPr>
+            <a:xfrm>
+              <a:off x="7354671" y="907820"/>
+              <a:ext cx="1149674" cy="307777"/>
+            </a:xfrm>
+            <a:prstGeom prst="rect">
+              <a:avLst/>
+            </a:prstGeom>
+            <a:noFill/>
+          </p:spPr>
+          <p:txBody>
+            <a:bodyPr wrap="none" rtlCol="0" anchor="ctr">
+              <a:spAutoFit/>
+            </a:bodyPr>
+            <a:lstStyle/>
+            <a:p>
+              <a:pPr algn="ctr"/>
+              <a:r>
+                <a:rPr lang="en-US" sz="1400" dirty="0">
+                  <a:latin typeface="Gotham" panose="02000303000000000000" pitchFamily="50" charset="0"/>
+                </a:rPr>
+                <a:t>Packaging</a:t>
+              </a:r>
+              <a:endParaRPr lang="en-MY" sz="1400" dirty="0">
+                <a:latin typeface="Gotham" panose="02000303000000000000" pitchFamily="50" charset="0"/>
+              </a:endParaRPr>
+            </a:p>
+          </p:txBody>
+        </p:sp>
+        <p:grpSp>
+          <p:nvGrpSpPr>
+            <p:cNvPr id="12" name="Group 11">
+              <a:extLst>
+                <a:ext uri="{FF2B5EF4-FFF2-40B4-BE49-F238E27FC236}">
+                  <a16:creationId xmlns:a16="http://schemas.microsoft.com/office/drawing/2014/main" id="{CDFB4DDA-5891-4ABE-A339-5FC4034E4BB7}"/>
+                </a:ext>
+              </a:extLst>
+            </p:cNvPr>
+            <p:cNvGrpSpPr/>
+            <p:nvPr/>
+          </p:nvGrpSpPr>
+          <p:grpSpPr>
+            <a:xfrm>
+              <a:off x="6693784" y="2793006"/>
+              <a:ext cx="1579278" cy="749940"/>
+              <a:chOff x="8066913" y="1500818"/>
+              <a:chExt cx="1579278" cy="749940"/>
+            </a:xfrm>
+            <a:noFill/>
+          </p:grpSpPr>
+          <p:sp>
+            <p:nvSpPr>
+              <p:cNvPr id="10" name="Rectangle: Rounded Corners 9">
+                <a:extLst>
+                  <a:ext uri="{FF2B5EF4-FFF2-40B4-BE49-F238E27FC236}">
+                    <a16:creationId xmlns:a16="http://schemas.microsoft.com/office/drawing/2014/main" id="{6649D53C-A210-484A-B230-2DFDBB8ECFC5}"/>
+                  </a:ext>
+                </a:extLst>
+              </p:cNvPr>
+              <p:cNvSpPr/>
+              <p:nvPr/>
+            </p:nvSpPr>
+            <p:spPr>
+              <a:xfrm>
+                <a:off x="8119768" y="1500818"/>
+                <a:ext cx="1473565" cy="749940"/>
+              </a:xfrm>
+              <a:prstGeom prst="roundRect">
+                <a:avLst/>
+              </a:prstGeom>
+              <a:solidFill>
+                <a:schemeClr val="bg1"/>
+              </a:solidFill>
+              <a:ln w="38100"/>
+            </p:spPr>
+            <p:style>
+              <a:lnRef idx="2">
+                <a:schemeClr val="accent6">
+                  <a:shade val="50000"/>
+                </a:schemeClr>
+              </a:lnRef>
+              <a:fillRef idx="1">
+                <a:schemeClr val="accent6"/>
+              </a:fillRef>
+              <a:effectRef idx="0">
+                <a:schemeClr val="accent6"/>
+              </a:effectRef>
+              <a:fontRef idx="minor">
+                <a:schemeClr val="lt1"/>
+              </a:fontRef>
+            </p:style>
+            <p:txBody>
+              <a:bodyPr rtlCol="0" anchor="ctr"/>
+              <a:lstStyle/>
+              <a:p>
+                <a:pPr algn="ctr"/>
+                <a:endParaRPr lang="en-MY" sz="1400" dirty="0">
+                  <a:latin typeface="Gotham" panose="02000303000000000000" pitchFamily="50" charset="0"/>
+                </a:endParaRPr>
+              </a:p>
+            </p:txBody>
+          </p:sp>
+          <p:sp>
+            <p:nvSpPr>
+              <p:cNvPr id="11" name="TextBox 10">
+                <a:extLst>
+                  <a:ext uri="{FF2B5EF4-FFF2-40B4-BE49-F238E27FC236}">
+                    <a16:creationId xmlns:a16="http://schemas.microsoft.com/office/drawing/2014/main" id="{BD277EBF-014D-4FCB-9576-339BCB9B2D0F}"/>
+                  </a:ext>
+                </a:extLst>
+              </p:cNvPr>
+              <p:cNvSpPr txBox="1"/>
+              <p:nvPr/>
+            </p:nvSpPr>
+            <p:spPr>
+              <a:xfrm>
+                <a:off x="8066913" y="1691122"/>
+                <a:ext cx="1579278" cy="307777"/>
+              </a:xfrm>
+              <a:prstGeom prst="rect">
+                <a:avLst/>
+              </a:prstGeom>
+              <a:grpFill/>
+            </p:spPr>
+            <p:txBody>
+              <a:bodyPr wrap="none" rtlCol="0" anchor="ctr">
+                <a:spAutoFit/>
+              </a:bodyPr>
+              <a:lstStyle/>
+              <a:p>
+                <a:pPr algn="ctr"/>
+                <a:r>
+                  <a:rPr lang="en-US" sz="1400" dirty="0">
+                    <a:latin typeface="Gotham" panose="02000303000000000000" pitchFamily="50" charset="0"/>
+                  </a:rPr>
+                  <a:t>Package shape</a:t>
+                </a:r>
+                <a:endParaRPr lang="en-MY" sz="1400" dirty="0">
+                  <a:latin typeface="Gotham" panose="02000303000000000000" pitchFamily="50" charset="0"/>
+                </a:endParaRPr>
+              </a:p>
+            </p:txBody>
+          </p:sp>
+        </p:grpSp>
+        <p:grpSp>
+          <p:nvGrpSpPr>
+            <p:cNvPr id="13" name="Group 12">
+              <a:extLst>
+                <a:ext uri="{FF2B5EF4-FFF2-40B4-BE49-F238E27FC236}">
+                  <a16:creationId xmlns:a16="http://schemas.microsoft.com/office/drawing/2014/main" id="{6C7096DB-CD4C-4C83-B86E-B2919B709C6D}"/>
+                </a:ext>
+              </a:extLst>
+            </p:cNvPr>
+            <p:cNvGrpSpPr/>
+            <p:nvPr/>
+          </p:nvGrpSpPr>
+          <p:grpSpPr>
+            <a:xfrm>
+              <a:off x="8464975" y="2793006"/>
+              <a:ext cx="1473565" cy="749940"/>
+              <a:chOff x="8119768" y="1500818"/>
+              <a:chExt cx="1473565" cy="749940"/>
+            </a:xfrm>
+          </p:grpSpPr>
+          <p:sp>
+            <p:nvSpPr>
+              <p:cNvPr id="14" name="Rectangle: Rounded Corners 13">
+                <a:extLst>
+                  <a:ext uri="{FF2B5EF4-FFF2-40B4-BE49-F238E27FC236}">
+                    <a16:creationId xmlns:a16="http://schemas.microsoft.com/office/drawing/2014/main" id="{CD237A7C-1061-40C6-9C2C-F8BD8DBFB31B}"/>
+                  </a:ext>
+                </a:extLst>
+              </p:cNvPr>
+              <p:cNvSpPr/>
+              <p:nvPr/>
+            </p:nvSpPr>
+            <p:spPr>
+              <a:xfrm>
+                <a:off x="8119768" y="1500818"/>
+                <a:ext cx="1473565" cy="749940"/>
+              </a:xfrm>
+              <a:prstGeom prst="roundRect">
+                <a:avLst/>
+              </a:prstGeom>
+              <a:noFill/>
+              <a:ln w="38100"/>
+            </p:spPr>
+            <p:style>
+              <a:lnRef idx="2">
+                <a:schemeClr val="accent6">
+                  <a:shade val="50000"/>
+                </a:schemeClr>
+              </a:lnRef>
+              <a:fillRef idx="1">
+                <a:schemeClr val="accent6"/>
+              </a:fillRef>
+              <a:effectRef idx="0">
+                <a:schemeClr val="accent6"/>
+              </a:effectRef>
+              <a:fontRef idx="minor">
+                <a:schemeClr val="lt1"/>
+              </a:fontRef>
+            </p:style>
+            <p:txBody>
+              <a:bodyPr rtlCol="0" anchor="ctr"/>
+              <a:lstStyle/>
+              <a:p>
+                <a:pPr algn="ctr"/>
+                <a:endParaRPr lang="en-MY" sz="1400">
+                  <a:latin typeface="Gotham" panose="02000303000000000000" pitchFamily="50" charset="0"/>
+                </a:endParaRPr>
+              </a:p>
+            </p:txBody>
+          </p:sp>
+          <p:sp>
+            <p:nvSpPr>
+              <p:cNvPr id="15" name="TextBox 14">
+                <a:extLst>
+                  <a:ext uri="{FF2B5EF4-FFF2-40B4-BE49-F238E27FC236}">
+                    <a16:creationId xmlns:a16="http://schemas.microsoft.com/office/drawing/2014/main" id="{241DD1E6-5189-4A87-B768-A87CB4B4DEB3}"/>
+                  </a:ext>
+                </a:extLst>
+              </p:cNvPr>
+              <p:cNvSpPr txBox="1"/>
+              <p:nvPr/>
+            </p:nvSpPr>
+            <p:spPr>
+              <a:xfrm>
+                <a:off x="8341826" y="1552622"/>
+                <a:ext cx="1029448" cy="523220"/>
+              </a:xfrm>
+              <a:prstGeom prst="rect">
+                <a:avLst/>
+              </a:prstGeom>
+              <a:noFill/>
+            </p:spPr>
+            <p:txBody>
+              <a:bodyPr wrap="none" rtlCol="0" anchor="ctr">
+                <a:spAutoFit/>
+              </a:bodyPr>
+              <a:lstStyle/>
+              <a:p>
+                <a:pPr algn="ctr"/>
+                <a:r>
+                  <a:rPr lang="en-US" sz="1400" dirty="0">
+                    <a:latin typeface="Gotham" panose="02000303000000000000" pitchFamily="50" charset="0"/>
+                  </a:rPr>
+                  <a:t>Package </a:t>
+                </a:r>
+              </a:p>
+              <a:p>
+                <a:pPr algn="ctr"/>
+                <a:r>
+                  <a:rPr lang="en-US" sz="1400" dirty="0">
+                    <a:latin typeface="Gotham" panose="02000303000000000000" pitchFamily="50" charset="0"/>
+                  </a:rPr>
+                  <a:t>material</a:t>
+                </a:r>
+                <a:endParaRPr lang="en-MY" sz="1400" dirty="0">
+                  <a:latin typeface="Gotham" panose="02000303000000000000" pitchFamily="50" charset="0"/>
+                </a:endParaRPr>
+              </a:p>
+            </p:txBody>
+          </p:sp>
+        </p:grpSp>
+        <p:grpSp>
+          <p:nvGrpSpPr>
+            <p:cNvPr id="16" name="Group 15">
+              <a:extLst>
+                <a:ext uri="{FF2B5EF4-FFF2-40B4-BE49-F238E27FC236}">
+                  <a16:creationId xmlns:a16="http://schemas.microsoft.com/office/drawing/2014/main" id="{FF07EFF6-079B-49DC-98CA-C167BC194F79}"/>
+                </a:ext>
+              </a:extLst>
+            </p:cNvPr>
+            <p:cNvGrpSpPr/>
+            <p:nvPr/>
+          </p:nvGrpSpPr>
+          <p:grpSpPr>
+            <a:xfrm>
+              <a:off x="5028305" y="2793006"/>
+              <a:ext cx="1473565" cy="749940"/>
+              <a:chOff x="8119768" y="1500818"/>
+              <a:chExt cx="1473565" cy="749940"/>
+            </a:xfrm>
+          </p:grpSpPr>
+          <p:sp>
+            <p:nvSpPr>
+              <p:cNvPr id="17" name="Rectangle: Rounded Corners 16">
+                <a:extLst>
+                  <a:ext uri="{FF2B5EF4-FFF2-40B4-BE49-F238E27FC236}">
+                    <a16:creationId xmlns:a16="http://schemas.microsoft.com/office/drawing/2014/main" id="{DF98AF46-6432-47F5-8974-E2C28DE5D3E0}"/>
+                  </a:ext>
+                </a:extLst>
+              </p:cNvPr>
+              <p:cNvSpPr/>
+              <p:nvPr/>
+            </p:nvSpPr>
+            <p:spPr>
+              <a:xfrm>
+                <a:off x="8119768" y="1500818"/>
+                <a:ext cx="1473565" cy="749940"/>
+              </a:xfrm>
+              <a:prstGeom prst="roundRect">
+                <a:avLst/>
+              </a:prstGeom>
+              <a:noFill/>
+              <a:ln w="38100"/>
+            </p:spPr>
+            <p:style>
+              <a:lnRef idx="2">
+                <a:schemeClr val="accent6">
+                  <a:shade val="50000"/>
+                </a:schemeClr>
+              </a:lnRef>
+              <a:fillRef idx="1">
+                <a:schemeClr val="accent6"/>
+              </a:fillRef>
+              <a:effectRef idx="0">
+                <a:schemeClr val="accent6"/>
+              </a:effectRef>
+              <a:fontRef idx="minor">
+                <a:schemeClr val="lt1"/>
+              </a:fontRef>
+            </p:style>
+            <p:txBody>
+              <a:bodyPr rtlCol="0" anchor="ctr"/>
+              <a:lstStyle/>
+              <a:p>
+                <a:pPr algn="ctr"/>
+                <a:endParaRPr lang="en-MY" sz="1400">
+                  <a:latin typeface="Gotham" panose="02000303000000000000" pitchFamily="50" charset="0"/>
+                </a:endParaRPr>
+              </a:p>
+            </p:txBody>
+          </p:sp>
+          <p:sp>
+            <p:nvSpPr>
+              <p:cNvPr id="18" name="TextBox 17">
+                <a:extLst>
+                  <a:ext uri="{FF2B5EF4-FFF2-40B4-BE49-F238E27FC236}">
+                    <a16:creationId xmlns:a16="http://schemas.microsoft.com/office/drawing/2014/main" id="{9C99273D-2556-4FCB-A205-8653635FF988}"/>
+                  </a:ext>
+                </a:extLst>
+              </p:cNvPr>
+              <p:cNvSpPr txBox="1"/>
+              <p:nvPr/>
+            </p:nvSpPr>
+            <p:spPr>
+              <a:xfrm>
+                <a:off x="8147060" y="1546983"/>
+                <a:ext cx="1418978" cy="523220"/>
+              </a:xfrm>
+              <a:prstGeom prst="rect">
+                <a:avLst/>
+              </a:prstGeom>
+              <a:noFill/>
+            </p:spPr>
+            <p:txBody>
+              <a:bodyPr wrap="none" rtlCol="0" anchor="ctr">
+                <a:spAutoFit/>
+              </a:bodyPr>
+              <a:lstStyle/>
+              <a:p>
+                <a:pPr algn="ctr"/>
+                <a:r>
+                  <a:rPr lang="en-US" sz="1400" dirty="0">
+                    <a:latin typeface="Gotham" panose="02000303000000000000" pitchFamily="50" charset="0"/>
+                  </a:rPr>
+                  <a:t>Arrangement</a:t>
+                </a:r>
+              </a:p>
+              <a:p>
+                <a:pPr algn="ctr"/>
+                <a:r>
+                  <a:rPr lang="en-US" sz="1400" dirty="0">
+                    <a:latin typeface="Gotham" panose="02000303000000000000" pitchFamily="50" charset="0"/>
+                  </a:rPr>
+                  <a:t>of Load</a:t>
+                </a:r>
+                <a:endParaRPr lang="en-MY" sz="1400" dirty="0">
+                  <a:latin typeface="Gotham" panose="02000303000000000000" pitchFamily="50" charset="0"/>
+                </a:endParaRPr>
+              </a:p>
+            </p:txBody>
+          </p:sp>
+        </p:grpSp>
+        <p:grpSp>
+          <p:nvGrpSpPr>
+            <p:cNvPr id="19" name="Group 18">
+              <a:extLst>
+                <a:ext uri="{FF2B5EF4-FFF2-40B4-BE49-F238E27FC236}">
+                  <a16:creationId xmlns:a16="http://schemas.microsoft.com/office/drawing/2014/main" id="{31B735D7-92CB-4F0B-BFAB-15241D4AB643}"/>
+                </a:ext>
+              </a:extLst>
+            </p:cNvPr>
+            <p:cNvGrpSpPr/>
+            <p:nvPr/>
+          </p:nvGrpSpPr>
+          <p:grpSpPr>
+            <a:xfrm>
+              <a:off x="3349394" y="2793006"/>
+              <a:ext cx="1473565" cy="749940"/>
+              <a:chOff x="8119768" y="1500818"/>
+              <a:chExt cx="1473565" cy="749940"/>
+            </a:xfrm>
+          </p:grpSpPr>
+          <p:sp>
+            <p:nvSpPr>
+              <p:cNvPr id="20" name="Rectangle: Rounded Corners 19">
+                <a:extLst>
+                  <a:ext uri="{FF2B5EF4-FFF2-40B4-BE49-F238E27FC236}">
+                    <a16:creationId xmlns:a16="http://schemas.microsoft.com/office/drawing/2014/main" id="{F00EF21A-BCF9-4A55-9311-5C771C2E6948}"/>
+                  </a:ext>
+                </a:extLst>
+              </p:cNvPr>
+              <p:cNvSpPr/>
+              <p:nvPr/>
+            </p:nvSpPr>
+            <p:spPr>
+              <a:xfrm>
+                <a:off x="8119768" y="1500818"/>
+                <a:ext cx="1473565" cy="749940"/>
+              </a:xfrm>
+              <a:prstGeom prst="roundRect">
+                <a:avLst/>
+              </a:prstGeom>
+              <a:solidFill>
+                <a:schemeClr val="bg1"/>
+              </a:solidFill>
+              <a:ln w="38100"/>
+            </p:spPr>
+            <p:style>
+              <a:lnRef idx="2">
+                <a:schemeClr val="accent6">
+                  <a:shade val="50000"/>
+                </a:schemeClr>
+              </a:lnRef>
+              <a:fillRef idx="1">
+                <a:schemeClr val="accent6"/>
+              </a:fillRef>
+              <a:effectRef idx="0">
+                <a:schemeClr val="accent6"/>
+              </a:effectRef>
+              <a:fontRef idx="minor">
+                <a:schemeClr val="lt1"/>
+              </a:fontRef>
+            </p:style>
+            <p:txBody>
+              <a:bodyPr rtlCol="0" anchor="ctr"/>
+              <a:lstStyle/>
+              <a:p>
+                <a:pPr algn="ctr"/>
+                <a:endParaRPr lang="en-MY" sz="1400" dirty="0">
+                  <a:latin typeface="Gotham" panose="02000303000000000000" pitchFamily="50" charset="0"/>
+                </a:endParaRPr>
+              </a:p>
+            </p:txBody>
+          </p:sp>
+          <p:sp>
+            <p:nvSpPr>
+              <p:cNvPr id="21" name="TextBox 20">
+                <a:extLst>
+                  <a:ext uri="{FF2B5EF4-FFF2-40B4-BE49-F238E27FC236}">
+                    <a16:creationId xmlns:a16="http://schemas.microsoft.com/office/drawing/2014/main" id="{FC803CFD-969A-4B9B-8FCA-77F6E9E9D2B2}"/>
+                  </a:ext>
+                </a:extLst>
+              </p:cNvPr>
+              <p:cNvSpPr txBox="1"/>
+              <p:nvPr/>
+            </p:nvSpPr>
+            <p:spPr>
+              <a:xfrm>
+                <a:off x="8324361" y="1553560"/>
+                <a:ext cx="1071127" cy="523220"/>
+              </a:xfrm>
+              <a:prstGeom prst="rect">
+                <a:avLst/>
+              </a:prstGeom>
+              <a:noFill/>
+            </p:spPr>
+            <p:txBody>
+              <a:bodyPr wrap="none" rtlCol="0" anchor="ctr">
+                <a:spAutoFit/>
+              </a:bodyPr>
+              <a:lstStyle/>
+              <a:p>
+                <a:pPr algn="ctr"/>
+                <a:r>
+                  <a:rPr lang="en-US" sz="1400" dirty="0">
+                    <a:latin typeface="Gotham" panose="02000303000000000000" pitchFamily="50" charset="0"/>
+                  </a:rPr>
+                  <a:t>Shipment</a:t>
+                </a:r>
+              </a:p>
+              <a:p>
+                <a:pPr algn="ctr"/>
+                <a:r>
+                  <a:rPr lang="en-US" sz="1400" dirty="0">
+                    <a:latin typeface="Gotham" panose="02000303000000000000" pitchFamily="50" charset="0"/>
+                  </a:rPr>
+                  <a:t>Schedule</a:t>
+                </a:r>
+                <a:endParaRPr lang="en-MY" sz="1400" dirty="0">
+                  <a:latin typeface="Gotham" panose="02000303000000000000" pitchFamily="50" charset="0"/>
+                </a:endParaRPr>
+              </a:p>
+            </p:txBody>
+          </p:sp>
+        </p:grpSp>
+        <p:sp>
+          <p:nvSpPr>
+            <p:cNvPr id="22" name="Rectangle 21">
+              <a:extLst>
+                <a:ext uri="{FF2B5EF4-FFF2-40B4-BE49-F238E27FC236}">
+                  <a16:creationId xmlns:a16="http://schemas.microsoft.com/office/drawing/2014/main" id="{A936186D-C058-4396-9FC9-1885571DA9A4}"/>
+                </a:ext>
+              </a:extLst>
+            </p:cNvPr>
+            <p:cNvSpPr/>
+            <p:nvPr/>
+          </p:nvSpPr>
+          <p:spPr>
+            <a:xfrm>
+              <a:off x="8379952" y="1323082"/>
+              <a:ext cx="1976560" cy="315764"/>
+            </a:xfrm>
+            <a:prstGeom prst="rect">
+              <a:avLst/>
+            </a:prstGeom>
+            <a:solidFill>
+              <a:schemeClr val="bg1"/>
+            </a:solidFill>
+            <a:ln w="38100"/>
+          </p:spPr>
+          <p:style>
+            <a:lnRef idx="2">
+              <a:schemeClr val="accent3">
+                <a:shade val="50000"/>
+              </a:schemeClr>
+            </a:lnRef>
+            <a:fillRef idx="1">
+              <a:schemeClr val="accent3"/>
+            </a:fillRef>
+            <a:effectRef idx="0">
+              <a:schemeClr val="accent3"/>
+            </a:effectRef>
+            <a:fontRef idx="minor">
+              <a:schemeClr val="lt1"/>
+            </a:fontRef>
+          </p:style>
+          <p:txBody>
+            <a:bodyPr rtlCol="0" anchor="ctr"/>
+            <a:lstStyle/>
+            <a:p>
+              <a:pPr algn="ctr"/>
+              <a:r>
+                <a:rPr lang="en-US" sz="1400" dirty="0">
+                  <a:solidFill>
+                    <a:schemeClr val="tx1"/>
+                  </a:solidFill>
+                  <a:latin typeface="Gotham" panose="02000303000000000000" pitchFamily="50" charset="0"/>
+                </a:rPr>
+                <a:t>Test Requirements</a:t>
+              </a:r>
+              <a:endParaRPr lang="en-MY" sz="1400" dirty="0">
+                <a:solidFill>
+                  <a:schemeClr val="tx1"/>
+                </a:solidFill>
+                <a:latin typeface="Gotham" panose="02000303000000000000" pitchFamily="50" charset="0"/>
+              </a:endParaRPr>
+            </a:p>
+          </p:txBody>
+        </p:sp>
+        <p:sp>
+          <p:nvSpPr>
+            <p:cNvPr id="23" name="Rectangle 22">
+              <a:extLst>
+                <a:ext uri="{FF2B5EF4-FFF2-40B4-BE49-F238E27FC236}">
+                  <a16:creationId xmlns:a16="http://schemas.microsoft.com/office/drawing/2014/main" id="{EAC0E2DB-F07C-4252-B191-21EFCC419DEB}"/>
+                </a:ext>
+              </a:extLst>
+            </p:cNvPr>
+            <p:cNvSpPr/>
+            <p:nvPr/>
+          </p:nvSpPr>
+          <p:spPr>
+            <a:xfrm>
+              <a:off x="8369522" y="1728743"/>
+              <a:ext cx="2028717" cy="315764"/>
+            </a:xfrm>
+            <a:prstGeom prst="rect">
+              <a:avLst/>
+            </a:prstGeom>
+            <a:solidFill>
+              <a:schemeClr val="bg1"/>
+            </a:solidFill>
+            <a:ln w="38100"/>
+          </p:spPr>
+          <p:style>
+            <a:lnRef idx="2">
+              <a:schemeClr val="accent3">
+                <a:shade val="50000"/>
+              </a:schemeClr>
+            </a:lnRef>
+            <a:fillRef idx="1">
+              <a:schemeClr val="accent3"/>
+            </a:fillRef>
+            <a:effectRef idx="0">
+              <a:schemeClr val="accent3"/>
+            </a:effectRef>
+            <a:fontRef idx="minor">
+              <a:schemeClr val="lt1"/>
+            </a:fontRef>
+          </p:style>
+          <p:txBody>
+            <a:bodyPr rtlCol="0" anchor="ctr"/>
+            <a:lstStyle/>
+            <a:p>
+              <a:pPr algn="ctr"/>
+              <a:r>
+                <a:rPr lang="en-US" sz="1400" dirty="0">
+                  <a:solidFill>
+                    <a:schemeClr val="tx1"/>
+                  </a:solidFill>
+                  <a:latin typeface="Gotham" panose="02000303000000000000" pitchFamily="50" charset="0"/>
+                </a:rPr>
+                <a:t>Approved materials</a:t>
+              </a:r>
+              <a:endParaRPr lang="en-MY" sz="1400" dirty="0">
+                <a:solidFill>
+                  <a:schemeClr val="tx1"/>
+                </a:solidFill>
+                <a:latin typeface="Gotham" panose="02000303000000000000" pitchFamily="50" charset="0"/>
+              </a:endParaRPr>
+            </a:p>
+          </p:txBody>
+        </p:sp>
+        <p:sp>
+          <p:nvSpPr>
+            <p:cNvPr id="24" name="Rectangle 23">
+              <a:extLst>
+                <a:ext uri="{FF2B5EF4-FFF2-40B4-BE49-F238E27FC236}">
+                  <a16:creationId xmlns:a16="http://schemas.microsoft.com/office/drawing/2014/main" id="{F9A4C99E-494F-4133-9CB0-B5B0C2C2FC64}"/>
+                </a:ext>
+              </a:extLst>
+            </p:cNvPr>
+            <p:cNvSpPr/>
+            <p:nvPr/>
+          </p:nvSpPr>
+          <p:spPr>
+            <a:xfrm>
+              <a:off x="8479803" y="4951425"/>
+              <a:ext cx="1976560" cy="315764"/>
+            </a:xfrm>
+            <a:prstGeom prst="rect">
+              <a:avLst/>
+            </a:prstGeom>
+            <a:solidFill>
+              <a:schemeClr val="bg1"/>
+            </a:solidFill>
+            <a:ln w="38100"/>
+          </p:spPr>
+          <p:style>
+            <a:lnRef idx="2">
+              <a:schemeClr val="accent3">
+                <a:shade val="50000"/>
+              </a:schemeClr>
+            </a:lnRef>
+            <a:fillRef idx="1">
+              <a:schemeClr val="accent3"/>
+            </a:fillRef>
+            <a:effectRef idx="0">
+              <a:schemeClr val="accent3"/>
+            </a:effectRef>
+            <a:fontRef idx="minor">
+              <a:schemeClr val="lt1"/>
+            </a:fontRef>
+          </p:style>
+          <p:txBody>
+            <a:bodyPr rtlCol="0" anchor="ctr"/>
+            <a:lstStyle/>
+            <a:p>
+              <a:pPr algn="ctr"/>
+              <a:r>
+                <a:rPr lang="en-US" sz="1400" dirty="0">
+                  <a:solidFill>
+                    <a:schemeClr val="tx1"/>
+                  </a:solidFill>
+                  <a:latin typeface="Gotham" panose="02000303000000000000" pitchFamily="50" charset="0"/>
+                </a:rPr>
+                <a:t>Graphic design</a:t>
+              </a:r>
+              <a:endParaRPr lang="en-MY" sz="1400" dirty="0">
+                <a:solidFill>
+                  <a:schemeClr val="tx1"/>
+                </a:solidFill>
+                <a:latin typeface="Gotham" panose="02000303000000000000" pitchFamily="50" charset="0"/>
+              </a:endParaRPr>
+            </a:p>
+          </p:txBody>
+        </p:sp>
+        <p:grpSp>
+          <p:nvGrpSpPr>
+            <p:cNvPr id="25" name="Group 24">
+              <a:extLst>
+                <a:ext uri="{FF2B5EF4-FFF2-40B4-BE49-F238E27FC236}">
+                  <a16:creationId xmlns:a16="http://schemas.microsoft.com/office/drawing/2014/main" id="{C48D280F-B268-4A6E-B847-628BF81D1B45}"/>
+                </a:ext>
+              </a:extLst>
+            </p:cNvPr>
+            <p:cNvGrpSpPr/>
+            <p:nvPr/>
+          </p:nvGrpSpPr>
+          <p:grpSpPr>
+            <a:xfrm>
+              <a:off x="6746637" y="3760977"/>
+              <a:ext cx="1473565" cy="749940"/>
+              <a:chOff x="8119768" y="1500818"/>
+              <a:chExt cx="1473565" cy="749940"/>
+            </a:xfrm>
+            <a:noFill/>
+          </p:grpSpPr>
+          <p:sp>
+            <p:nvSpPr>
+              <p:cNvPr id="26" name="Rectangle: Rounded Corners 25">
+                <a:extLst>
+                  <a:ext uri="{FF2B5EF4-FFF2-40B4-BE49-F238E27FC236}">
+                    <a16:creationId xmlns:a16="http://schemas.microsoft.com/office/drawing/2014/main" id="{C87C5EC6-E508-46C4-B9F7-4E113BA4DB82}"/>
+                  </a:ext>
+                </a:extLst>
+              </p:cNvPr>
+              <p:cNvSpPr/>
+              <p:nvPr/>
+            </p:nvSpPr>
+            <p:spPr>
+              <a:xfrm>
+                <a:off x="8119768" y="1500818"/>
+                <a:ext cx="1473565" cy="749940"/>
+              </a:xfrm>
+              <a:prstGeom prst="roundRect">
+                <a:avLst/>
+              </a:prstGeom>
+              <a:solidFill>
+                <a:schemeClr val="bg1"/>
+              </a:solidFill>
+              <a:ln w="38100"/>
+            </p:spPr>
+            <p:style>
+              <a:lnRef idx="2">
+                <a:schemeClr val="accent6">
+                  <a:shade val="50000"/>
+                </a:schemeClr>
+              </a:lnRef>
+              <a:fillRef idx="1">
+                <a:schemeClr val="accent6"/>
+              </a:fillRef>
+              <a:effectRef idx="0">
+                <a:schemeClr val="accent6"/>
+              </a:effectRef>
+              <a:fontRef idx="minor">
+                <a:schemeClr val="lt1"/>
+              </a:fontRef>
+            </p:style>
+            <p:txBody>
+              <a:bodyPr rtlCol="0" anchor="ctr"/>
+              <a:lstStyle/>
+              <a:p>
+                <a:pPr algn="ctr"/>
+                <a:endParaRPr lang="en-MY" sz="1400" dirty="0">
+                  <a:latin typeface="Gotham" panose="02000303000000000000" pitchFamily="50" charset="0"/>
+                </a:endParaRPr>
+              </a:p>
+            </p:txBody>
+          </p:sp>
+          <p:sp>
+            <p:nvSpPr>
+              <p:cNvPr id="27" name="TextBox 26">
+                <a:extLst>
+                  <a:ext uri="{FF2B5EF4-FFF2-40B4-BE49-F238E27FC236}">
+                    <a16:creationId xmlns:a16="http://schemas.microsoft.com/office/drawing/2014/main" id="{D753C99A-6B3F-4C71-9544-B4E810203045}"/>
+                  </a:ext>
+                </a:extLst>
+              </p:cNvPr>
+              <p:cNvSpPr txBox="1"/>
+              <p:nvPr/>
+            </p:nvSpPr>
+            <p:spPr>
+              <a:xfrm>
+                <a:off x="8363467" y="1549446"/>
+                <a:ext cx="986167" cy="523220"/>
+              </a:xfrm>
+              <a:prstGeom prst="rect">
+                <a:avLst/>
+              </a:prstGeom>
+              <a:grpFill/>
+            </p:spPr>
+            <p:txBody>
+              <a:bodyPr wrap="none" rtlCol="0" anchor="ctr">
+                <a:spAutoFit/>
+              </a:bodyPr>
+              <a:lstStyle/>
+              <a:p>
+                <a:pPr algn="ctr"/>
+                <a:r>
+                  <a:rPr lang="en-US" sz="1400" dirty="0">
+                    <a:latin typeface="Gotham" panose="02000303000000000000" pitchFamily="50" charset="0"/>
+                  </a:rPr>
+                  <a:t>Package</a:t>
+                </a:r>
+              </a:p>
+              <a:p>
+                <a:pPr algn="ctr"/>
+                <a:r>
+                  <a:rPr lang="en-US" sz="1400" dirty="0">
+                    <a:latin typeface="Gotham" panose="02000303000000000000" pitchFamily="50" charset="0"/>
+                  </a:rPr>
+                  <a:t>Strategy</a:t>
+                </a:r>
+                <a:endParaRPr lang="en-MY" sz="1400" dirty="0">
+                  <a:latin typeface="Gotham" panose="02000303000000000000" pitchFamily="50" charset="0"/>
+                </a:endParaRPr>
+              </a:p>
+            </p:txBody>
+          </p:sp>
+        </p:grpSp>
+        <p:sp>
+          <p:nvSpPr>
+            <p:cNvPr id="28" name="Rectangle 27">
+              <a:extLst>
+                <a:ext uri="{FF2B5EF4-FFF2-40B4-BE49-F238E27FC236}">
+                  <a16:creationId xmlns:a16="http://schemas.microsoft.com/office/drawing/2014/main" id="{577D5A02-1CD7-4C25-A9C3-33D6CC1638D2}"/>
+                </a:ext>
+              </a:extLst>
+            </p:cNvPr>
+            <p:cNvSpPr/>
+            <p:nvPr/>
+          </p:nvSpPr>
+          <p:spPr>
+            <a:xfrm>
+              <a:off x="1321079" y="4026227"/>
+              <a:ext cx="1976560" cy="315764"/>
+            </a:xfrm>
+            <a:prstGeom prst="rect">
+              <a:avLst/>
+            </a:prstGeom>
+            <a:solidFill>
+              <a:schemeClr val="bg1"/>
+            </a:solidFill>
+            <a:ln w="38100"/>
+          </p:spPr>
+          <p:style>
+            <a:lnRef idx="2">
+              <a:schemeClr val="accent3">
+                <a:shade val="50000"/>
+              </a:schemeClr>
+            </a:lnRef>
+            <a:fillRef idx="1">
+              <a:schemeClr val="accent3"/>
+            </a:fillRef>
+            <a:effectRef idx="0">
+              <a:schemeClr val="accent3"/>
+            </a:effectRef>
+            <a:fontRef idx="minor">
+              <a:schemeClr val="lt1"/>
+            </a:fontRef>
+          </p:style>
+          <p:txBody>
+            <a:bodyPr rtlCol="0" anchor="ctr"/>
+            <a:lstStyle/>
+            <a:p>
+              <a:pPr algn="ctr"/>
+              <a:r>
+                <a:rPr lang="en-US" sz="1400" dirty="0">
+                  <a:solidFill>
+                    <a:schemeClr val="tx1"/>
+                  </a:solidFill>
+                  <a:latin typeface="Gotham" panose="02000303000000000000" pitchFamily="50" charset="0"/>
+                </a:rPr>
+                <a:t>Shipment Volume</a:t>
+              </a:r>
+              <a:endParaRPr lang="en-MY" sz="1400" dirty="0">
+                <a:solidFill>
+                  <a:schemeClr val="tx1"/>
+                </a:solidFill>
+                <a:latin typeface="Gotham" panose="02000303000000000000" pitchFamily="50" charset="0"/>
+              </a:endParaRPr>
+            </a:p>
+          </p:txBody>
+        </p:sp>
+        <p:sp>
+          <p:nvSpPr>
+            <p:cNvPr id="29" name="Rectangle 28">
+              <a:extLst>
+                <a:ext uri="{FF2B5EF4-FFF2-40B4-BE49-F238E27FC236}">
+                  <a16:creationId xmlns:a16="http://schemas.microsoft.com/office/drawing/2014/main" id="{1A61FE01-3879-4DEC-A6FE-210A5095C197}"/>
+                </a:ext>
+              </a:extLst>
+            </p:cNvPr>
+            <p:cNvSpPr/>
+            <p:nvPr/>
+          </p:nvSpPr>
+          <p:spPr>
+            <a:xfrm>
+              <a:off x="5149949" y="1320629"/>
+              <a:ext cx="1976560" cy="315764"/>
+            </a:xfrm>
+            <a:prstGeom prst="rect">
+              <a:avLst/>
+            </a:prstGeom>
+            <a:solidFill>
+              <a:schemeClr val="bg1"/>
+            </a:solidFill>
+            <a:ln w="38100"/>
+          </p:spPr>
+          <p:style>
+            <a:lnRef idx="2">
+              <a:schemeClr val="accent3">
+                <a:shade val="50000"/>
+              </a:schemeClr>
+            </a:lnRef>
+            <a:fillRef idx="1">
+              <a:schemeClr val="accent3"/>
+            </a:fillRef>
+            <a:effectRef idx="0">
+              <a:schemeClr val="accent3"/>
+            </a:effectRef>
+            <a:fontRef idx="minor">
+              <a:schemeClr val="lt1"/>
+            </a:fontRef>
+          </p:style>
+          <p:txBody>
+            <a:bodyPr rtlCol="0" anchor="ctr"/>
+            <a:lstStyle/>
+            <a:p>
+              <a:pPr algn="ctr"/>
+              <a:r>
+                <a:rPr lang="en-US" sz="1400" dirty="0">
+                  <a:solidFill>
+                    <a:schemeClr val="tx1"/>
+                  </a:solidFill>
+                  <a:latin typeface="Gotham" panose="02000303000000000000" pitchFamily="50" charset="0"/>
+                </a:rPr>
+                <a:t>Space Utilization</a:t>
+              </a:r>
+              <a:endParaRPr lang="en-MY" sz="1400" dirty="0">
+                <a:solidFill>
+                  <a:schemeClr val="tx1"/>
+                </a:solidFill>
+                <a:latin typeface="Gotham" panose="02000303000000000000" pitchFamily="50" charset="0"/>
+              </a:endParaRPr>
+            </a:p>
+          </p:txBody>
+        </p:sp>
+        <p:sp>
+          <p:nvSpPr>
+            <p:cNvPr id="30" name="Rectangle 29">
+              <a:extLst>
+                <a:ext uri="{FF2B5EF4-FFF2-40B4-BE49-F238E27FC236}">
+                  <a16:creationId xmlns:a16="http://schemas.microsoft.com/office/drawing/2014/main" id="{CA8151DA-5122-42EC-AF8A-BF32479105E5}"/>
+                </a:ext>
+              </a:extLst>
+            </p:cNvPr>
+            <p:cNvSpPr/>
+            <p:nvPr/>
+          </p:nvSpPr>
+          <p:spPr>
+            <a:xfrm>
+              <a:off x="1313121" y="4457035"/>
+              <a:ext cx="2175577" cy="315764"/>
+            </a:xfrm>
+            <a:prstGeom prst="rect">
+              <a:avLst/>
+            </a:prstGeom>
+            <a:solidFill>
+              <a:schemeClr val="bg1"/>
+            </a:solidFill>
+            <a:ln w="38100"/>
+          </p:spPr>
+          <p:style>
+            <a:lnRef idx="2">
+              <a:schemeClr val="accent3">
+                <a:shade val="50000"/>
+              </a:schemeClr>
+            </a:lnRef>
+            <a:fillRef idx="1">
+              <a:schemeClr val="accent3"/>
+            </a:fillRef>
+            <a:effectRef idx="0">
+              <a:schemeClr val="accent3"/>
+            </a:effectRef>
+            <a:fontRef idx="minor">
+              <a:schemeClr val="lt1"/>
+            </a:fontRef>
+          </p:style>
+          <p:txBody>
+            <a:bodyPr rtlCol="0" anchor="ctr"/>
+            <a:lstStyle/>
+            <a:p>
+              <a:pPr algn="ctr"/>
+              <a:r>
+                <a:rPr lang="en-US" sz="1400" dirty="0">
+                  <a:solidFill>
+                    <a:schemeClr val="tx1"/>
+                  </a:solidFill>
+                  <a:latin typeface="Gotham" panose="02000303000000000000" pitchFamily="50" charset="0"/>
+                </a:rPr>
+                <a:t>Shipment Frequency</a:t>
+              </a:r>
+              <a:endParaRPr lang="en-MY" sz="1400" dirty="0">
+                <a:solidFill>
+                  <a:schemeClr val="tx1"/>
+                </a:solidFill>
+                <a:latin typeface="Gotham" panose="02000303000000000000" pitchFamily="50" charset="0"/>
+              </a:endParaRPr>
+            </a:p>
+          </p:txBody>
+        </p:sp>
+        <p:sp>
+          <p:nvSpPr>
+            <p:cNvPr id="31" name="Rectangle 30">
+              <a:extLst>
+                <a:ext uri="{FF2B5EF4-FFF2-40B4-BE49-F238E27FC236}">
+                  <a16:creationId xmlns:a16="http://schemas.microsoft.com/office/drawing/2014/main" id="{BFC2A408-E559-4061-B77A-3C620A7CC695}"/>
+                </a:ext>
+              </a:extLst>
+            </p:cNvPr>
+            <p:cNvSpPr/>
+            <p:nvPr/>
+          </p:nvSpPr>
+          <p:spPr>
+            <a:xfrm>
+              <a:off x="1318426" y="4887843"/>
+              <a:ext cx="1976560" cy="315764"/>
+            </a:xfrm>
+            <a:prstGeom prst="rect">
+              <a:avLst/>
+            </a:prstGeom>
+            <a:solidFill>
+              <a:schemeClr val="bg1"/>
+            </a:solidFill>
+            <a:ln w="38100"/>
+          </p:spPr>
+          <p:style>
+            <a:lnRef idx="2">
+              <a:schemeClr val="accent3">
+                <a:shade val="50000"/>
+              </a:schemeClr>
+            </a:lnRef>
+            <a:fillRef idx="1">
+              <a:schemeClr val="accent3"/>
+            </a:fillRef>
+            <a:effectRef idx="0">
+              <a:schemeClr val="accent3"/>
+            </a:effectRef>
+            <a:fontRef idx="minor">
+              <a:schemeClr val="lt1"/>
+            </a:fontRef>
+          </p:style>
+          <p:txBody>
+            <a:bodyPr rtlCol="0" anchor="ctr"/>
+            <a:lstStyle/>
+            <a:p>
+              <a:pPr algn="ctr"/>
+              <a:r>
+                <a:rPr lang="en-US" sz="1400" dirty="0">
+                  <a:solidFill>
+                    <a:schemeClr val="tx1"/>
+                  </a:solidFill>
+                  <a:latin typeface="Gotham" panose="02000303000000000000" pitchFamily="50" charset="0"/>
+                </a:rPr>
+                <a:t>Shipment Cost</a:t>
+              </a:r>
+              <a:endParaRPr lang="en-MY" sz="1400" dirty="0">
+                <a:solidFill>
+                  <a:schemeClr val="tx1"/>
+                </a:solidFill>
+                <a:latin typeface="Gotham" panose="02000303000000000000" pitchFamily="50" charset="0"/>
+              </a:endParaRPr>
+            </a:p>
+          </p:txBody>
+        </p:sp>
+        <p:sp>
+          <p:nvSpPr>
+            <p:cNvPr id="32" name="Rectangle 31">
+              <a:extLst>
+                <a:ext uri="{FF2B5EF4-FFF2-40B4-BE49-F238E27FC236}">
+                  <a16:creationId xmlns:a16="http://schemas.microsoft.com/office/drawing/2014/main" id="{180426D7-034B-41CC-903B-39B4209D5AFE}"/>
+                </a:ext>
+              </a:extLst>
+            </p:cNvPr>
+            <p:cNvSpPr/>
+            <p:nvPr/>
+          </p:nvSpPr>
+          <p:spPr>
+            <a:xfrm>
+              <a:off x="3448718" y="4034228"/>
+              <a:ext cx="1976560" cy="315764"/>
+            </a:xfrm>
+            <a:prstGeom prst="rect">
+              <a:avLst/>
+            </a:prstGeom>
+            <a:solidFill>
+              <a:schemeClr val="bg1"/>
+            </a:solidFill>
+            <a:ln w="38100"/>
+          </p:spPr>
+          <p:style>
+            <a:lnRef idx="2">
+              <a:schemeClr val="accent3">
+                <a:shade val="50000"/>
+              </a:schemeClr>
+            </a:lnRef>
+            <a:fillRef idx="1">
+              <a:schemeClr val="accent3"/>
+            </a:fillRef>
+            <a:effectRef idx="0">
+              <a:schemeClr val="accent3"/>
+            </a:effectRef>
+            <a:fontRef idx="minor">
+              <a:schemeClr val="lt1"/>
+            </a:fontRef>
+          </p:style>
+          <p:txBody>
+            <a:bodyPr rtlCol="0" anchor="ctr"/>
+            <a:lstStyle/>
+            <a:p>
+              <a:pPr algn="ctr"/>
+              <a:r>
+                <a:rPr lang="en-US" sz="1400" dirty="0">
+                  <a:solidFill>
+                    <a:schemeClr val="tx1"/>
+                  </a:solidFill>
+                  <a:latin typeface="Gotham" panose="02000303000000000000" pitchFamily="50" charset="0"/>
+                </a:rPr>
+                <a:t>Shipment Load</a:t>
+              </a:r>
+              <a:endParaRPr lang="en-MY" sz="1400" dirty="0">
+                <a:solidFill>
+                  <a:schemeClr val="tx1"/>
+                </a:solidFill>
+                <a:latin typeface="Gotham" panose="02000303000000000000" pitchFamily="50" charset="0"/>
+              </a:endParaRPr>
+            </a:p>
+          </p:txBody>
+        </p:sp>
+        <p:sp>
+          <p:nvSpPr>
+            <p:cNvPr id="33" name="Rectangle 32">
+              <a:extLst>
+                <a:ext uri="{FF2B5EF4-FFF2-40B4-BE49-F238E27FC236}">
+                  <a16:creationId xmlns:a16="http://schemas.microsoft.com/office/drawing/2014/main" id="{1E0640F0-ADC7-4683-8452-35C93B670BF7}"/>
+                </a:ext>
+              </a:extLst>
+            </p:cNvPr>
+            <p:cNvSpPr/>
+            <p:nvPr/>
+          </p:nvSpPr>
+          <p:spPr>
+            <a:xfrm>
+              <a:off x="8479803" y="4494965"/>
+              <a:ext cx="1976560" cy="315764"/>
+            </a:xfrm>
+            <a:prstGeom prst="rect">
+              <a:avLst/>
+            </a:prstGeom>
+            <a:solidFill>
+              <a:schemeClr val="bg1"/>
+            </a:solidFill>
+            <a:ln w="38100"/>
+          </p:spPr>
+          <p:style>
+            <a:lnRef idx="2">
+              <a:schemeClr val="accent3">
+                <a:shade val="50000"/>
+              </a:schemeClr>
+            </a:lnRef>
+            <a:fillRef idx="1">
+              <a:schemeClr val="accent3"/>
+            </a:fillRef>
+            <a:effectRef idx="0">
+              <a:schemeClr val="accent3"/>
+            </a:effectRef>
+            <a:fontRef idx="minor">
+              <a:schemeClr val="lt1"/>
+            </a:fontRef>
+          </p:style>
+          <p:txBody>
+            <a:bodyPr rtlCol="0" anchor="ctr"/>
+            <a:lstStyle/>
+            <a:p>
+              <a:pPr algn="ctr"/>
+              <a:r>
+                <a:rPr lang="en-US" sz="1400" dirty="0">
+                  <a:solidFill>
+                    <a:schemeClr val="tx1"/>
+                  </a:solidFill>
+                  <a:latin typeface="Gotham" panose="02000303000000000000" pitchFamily="50" charset="0"/>
+                </a:rPr>
+                <a:t>Parts per Package</a:t>
+              </a:r>
+              <a:endParaRPr lang="en-MY" sz="1400" dirty="0">
+                <a:solidFill>
+                  <a:schemeClr val="tx1"/>
+                </a:solidFill>
+                <a:latin typeface="Gotham" panose="02000303000000000000" pitchFamily="50" charset="0"/>
+              </a:endParaRPr>
+            </a:p>
+          </p:txBody>
+        </p:sp>
+        <p:sp>
+          <p:nvSpPr>
+            <p:cNvPr id="34" name="Rectangle 33">
+              <a:extLst>
+                <a:ext uri="{FF2B5EF4-FFF2-40B4-BE49-F238E27FC236}">
+                  <a16:creationId xmlns:a16="http://schemas.microsoft.com/office/drawing/2014/main" id="{0FAAAA01-731D-44F0-808D-C6E3A89D3C58}"/>
+                </a:ext>
+              </a:extLst>
+            </p:cNvPr>
+            <p:cNvSpPr/>
+            <p:nvPr/>
+          </p:nvSpPr>
+          <p:spPr>
+            <a:xfrm>
+              <a:off x="3251986" y="1907741"/>
+              <a:ext cx="2260728" cy="315764"/>
+            </a:xfrm>
+            <a:prstGeom prst="rect">
+              <a:avLst/>
+            </a:prstGeom>
+            <a:solidFill>
+              <a:schemeClr val="bg1"/>
+            </a:solidFill>
+            <a:ln w="38100"/>
+          </p:spPr>
+          <p:style>
+            <a:lnRef idx="2">
+              <a:schemeClr val="accent3">
+                <a:shade val="50000"/>
+              </a:schemeClr>
+            </a:lnRef>
+            <a:fillRef idx="1">
+              <a:schemeClr val="accent3"/>
+            </a:fillRef>
+            <a:effectRef idx="0">
+              <a:schemeClr val="accent3"/>
+            </a:effectRef>
+            <a:fontRef idx="minor">
+              <a:schemeClr val="lt1"/>
+            </a:fontRef>
+          </p:style>
+          <p:txBody>
+            <a:bodyPr rtlCol="0" anchor="ctr"/>
+            <a:lstStyle/>
+            <a:p>
+              <a:pPr algn="ctr"/>
+              <a:r>
+                <a:rPr lang="en-US" sz="1400" dirty="0">
+                  <a:solidFill>
+                    <a:schemeClr val="tx1"/>
+                  </a:solidFill>
+                  <a:latin typeface="Gotham" panose="02000303000000000000" pitchFamily="50" charset="0"/>
+                </a:rPr>
+                <a:t>Utilization by Country</a:t>
+              </a:r>
+              <a:endParaRPr lang="en-MY" sz="1400" dirty="0">
+                <a:solidFill>
+                  <a:schemeClr val="tx1"/>
+                </a:solidFill>
+                <a:latin typeface="Gotham" panose="02000303000000000000" pitchFamily="50" charset="0"/>
+              </a:endParaRPr>
+            </a:p>
+          </p:txBody>
+        </p:sp>
+        <p:sp>
+          <p:nvSpPr>
+            <p:cNvPr id="35" name="Rectangle 34">
+              <a:extLst>
+                <a:ext uri="{FF2B5EF4-FFF2-40B4-BE49-F238E27FC236}">
+                  <a16:creationId xmlns:a16="http://schemas.microsoft.com/office/drawing/2014/main" id="{B538A19C-60F5-4EE4-A953-030FC7603245}"/>
+                </a:ext>
+              </a:extLst>
+            </p:cNvPr>
+            <p:cNvSpPr/>
+            <p:nvPr/>
+          </p:nvSpPr>
+          <p:spPr>
+            <a:xfrm>
+              <a:off x="8479803" y="4038505"/>
+              <a:ext cx="1976560" cy="315764"/>
+            </a:xfrm>
+            <a:prstGeom prst="rect">
+              <a:avLst/>
+            </a:prstGeom>
+            <a:solidFill>
+              <a:schemeClr val="bg1"/>
+            </a:solidFill>
+            <a:ln w="38100"/>
+          </p:spPr>
+          <p:style>
+            <a:lnRef idx="2">
+              <a:schemeClr val="accent3">
+                <a:shade val="50000"/>
+              </a:schemeClr>
+            </a:lnRef>
+            <a:fillRef idx="1">
+              <a:schemeClr val="accent3"/>
+            </a:fillRef>
+            <a:effectRef idx="0">
+              <a:schemeClr val="accent3"/>
+            </a:effectRef>
+            <a:fontRef idx="minor">
+              <a:schemeClr val="lt1"/>
+            </a:fontRef>
+          </p:style>
+          <p:txBody>
+            <a:bodyPr rtlCol="0" anchor="ctr"/>
+            <a:lstStyle/>
+            <a:p>
+              <a:pPr algn="ctr"/>
+              <a:r>
+                <a:rPr lang="en-US" sz="1400" dirty="0">
+                  <a:solidFill>
+                    <a:schemeClr val="tx1"/>
+                  </a:solidFill>
+                  <a:latin typeface="Gotham" panose="02000303000000000000" pitchFamily="50" charset="0"/>
+                </a:rPr>
+                <a:t>Packaging Cost</a:t>
+              </a:r>
+              <a:endParaRPr lang="en-MY" sz="1400" dirty="0">
+                <a:solidFill>
+                  <a:schemeClr val="tx1"/>
+                </a:solidFill>
+                <a:latin typeface="Gotham" panose="02000303000000000000" pitchFamily="50" charset="0"/>
+              </a:endParaRPr>
+            </a:p>
+          </p:txBody>
+        </p:sp>
+        <p:sp>
+          <p:nvSpPr>
+            <p:cNvPr id="36" name="Rectangle 35">
+              <a:extLst>
+                <a:ext uri="{FF2B5EF4-FFF2-40B4-BE49-F238E27FC236}">
+                  <a16:creationId xmlns:a16="http://schemas.microsoft.com/office/drawing/2014/main" id="{6EAE05A2-FACD-4609-A9E1-B5DE8D701169}"/>
+                </a:ext>
+              </a:extLst>
+            </p:cNvPr>
+            <p:cNvSpPr/>
+            <p:nvPr/>
+          </p:nvSpPr>
+          <p:spPr>
+            <a:xfrm>
+              <a:off x="8369522" y="2178630"/>
+              <a:ext cx="1976560" cy="315764"/>
+            </a:xfrm>
+            <a:prstGeom prst="rect">
+              <a:avLst/>
+            </a:prstGeom>
+            <a:solidFill>
+              <a:schemeClr val="bg1"/>
+            </a:solidFill>
+            <a:ln w="38100"/>
+          </p:spPr>
+          <p:style>
+            <a:lnRef idx="2">
+              <a:schemeClr val="accent3">
+                <a:shade val="50000"/>
+              </a:schemeClr>
+            </a:lnRef>
+            <a:fillRef idx="1">
+              <a:schemeClr val="accent3"/>
+            </a:fillRef>
+            <a:effectRef idx="0">
+              <a:schemeClr val="accent3"/>
+            </a:effectRef>
+            <a:fontRef idx="minor">
+              <a:schemeClr val="lt1"/>
+            </a:fontRef>
+          </p:style>
+          <p:txBody>
+            <a:bodyPr rtlCol="0" anchor="ctr"/>
+            <a:lstStyle/>
+            <a:p>
+              <a:pPr algn="ctr"/>
+              <a:r>
+                <a:rPr lang="en-US" sz="1400" dirty="0">
+                  <a:solidFill>
+                    <a:schemeClr val="tx1"/>
+                  </a:solidFill>
+                  <a:latin typeface="Gotham" panose="02000303000000000000" pitchFamily="50" charset="0"/>
+                </a:rPr>
+                <a:t>Package Quantity</a:t>
+              </a:r>
+              <a:endParaRPr lang="en-MY" sz="1400" dirty="0">
+                <a:solidFill>
+                  <a:schemeClr val="tx1"/>
+                </a:solidFill>
+                <a:latin typeface="Gotham" panose="02000303000000000000" pitchFamily="50" charset="0"/>
+              </a:endParaRPr>
+            </a:p>
+          </p:txBody>
+        </p:sp>
+        <p:sp>
+          <p:nvSpPr>
+            <p:cNvPr id="37" name="Rectangle 36">
+              <a:extLst>
+                <a:ext uri="{FF2B5EF4-FFF2-40B4-BE49-F238E27FC236}">
+                  <a16:creationId xmlns:a16="http://schemas.microsoft.com/office/drawing/2014/main" id="{B5BE9124-54D5-4782-BC32-DDA0E7F27C92}"/>
+                </a:ext>
+              </a:extLst>
+            </p:cNvPr>
+            <p:cNvSpPr/>
+            <p:nvPr/>
+          </p:nvSpPr>
+          <p:spPr>
+            <a:xfrm>
+              <a:off x="3643813" y="5331808"/>
+              <a:ext cx="4059513" cy="315764"/>
+            </a:xfrm>
+            <a:prstGeom prst="rect">
+              <a:avLst/>
+            </a:prstGeom>
+            <a:ln/>
+          </p:spPr>
+          <p:style>
+            <a:lnRef idx="2">
+              <a:schemeClr val="accent3">
+                <a:shade val="50000"/>
+              </a:schemeClr>
+            </a:lnRef>
+            <a:fillRef idx="1">
+              <a:schemeClr val="accent3"/>
+            </a:fillRef>
+            <a:effectRef idx="0">
+              <a:schemeClr val="accent3"/>
+            </a:effectRef>
+            <a:fontRef idx="minor">
+              <a:schemeClr val="lt1"/>
+            </a:fontRef>
+          </p:style>
+          <p:txBody>
+            <a:bodyPr rtlCol="0" anchor="ctr"/>
+            <a:lstStyle/>
+            <a:p>
+              <a:pPr algn="ctr"/>
+              <a:r>
+                <a:rPr lang="en-US" sz="1400" dirty="0">
+                  <a:solidFill>
+                    <a:schemeClr val="bg1"/>
+                  </a:solidFill>
+                  <a:latin typeface="Gotham" panose="02000303000000000000" pitchFamily="50" charset="0"/>
+                </a:rPr>
+                <a:t>Package to Shipment</a:t>
+              </a:r>
+              <a:endParaRPr lang="en-MY" sz="1400" dirty="0">
+                <a:solidFill>
+                  <a:schemeClr val="bg1"/>
+                </a:solidFill>
+                <a:latin typeface="Gotham" panose="02000303000000000000" pitchFamily="50" charset="0"/>
+              </a:endParaRPr>
+            </a:p>
+          </p:txBody>
+        </p:sp>
+        <p:sp>
+          <p:nvSpPr>
+            <p:cNvPr id="38" name="Rectangle 37">
+              <a:extLst>
+                <a:ext uri="{FF2B5EF4-FFF2-40B4-BE49-F238E27FC236}">
+                  <a16:creationId xmlns:a16="http://schemas.microsoft.com/office/drawing/2014/main" id="{73B1A6E3-EA98-4603-A9BF-CFC1FF2D26D5}"/>
+                </a:ext>
+              </a:extLst>
+            </p:cNvPr>
+            <p:cNvSpPr/>
+            <p:nvPr/>
+          </p:nvSpPr>
+          <p:spPr>
+            <a:xfrm>
+              <a:off x="3643419" y="4891847"/>
+              <a:ext cx="4059512" cy="315764"/>
+            </a:xfrm>
+            <a:prstGeom prst="rect">
+              <a:avLst/>
+            </a:prstGeom>
+            <a:ln/>
+          </p:spPr>
+          <p:style>
+            <a:lnRef idx="2">
+              <a:schemeClr val="accent3">
+                <a:shade val="50000"/>
+              </a:schemeClr>
+            </a:lnRef>
+            <a:fillRef idx="1">
+              <a:schemeClr val="accent3"/>
+            </a:fillRef>
+            <a:effectRef idx="0">
+              <a:schemeClr val="accent3"/>
+            </a:effectRef>
+            <a:fontRef idx="minor">
+              <a:schemeClr val="lt1"/>
+            </a:fontRef>
+          </p:style>
+          <p:txBody>
+            <a:bodyPr rtlCol="0" anchor="ctr"/>
+            <a:lstStyle/>
+            <a:p>
+              <a:pPr algn="ctr"/>
+              <a:r>
+                <a:rPr lang="en-US" sz="1400" dirty="0">
+                  <a:solidFill>
+                    <a:schemeClr val="bg1"/>
+                  </a:solidFill>
+                  <a:latin typeface="Gotham" panose="02000303000000000000" pitchFamily="50" charset="0"/>
+                </a:rPr>
+                <a:t>Profit per Product</a:t>
+              </a:r>
+              <a:endParaRPr lang="en-MY" sz="1400" dirty="0">
+                <a:solidFill>
+                  <a:schemeClr val="bg1"/>
+                </a:solidFill>
+                <a:latin typeface="Gotham" panose="02000303000000000000" pitchFamily="50" charset="0"/>
+              </a:endParaRPr>
+            </a:p>
+          </p:txBody>
+        </p:sp>
+        <p:sp>
+          <p:nvSpPr>
+            <p:cNvPr id="39" name="Rectangle 38">
+              <a:extLst>
+                <a:ext uri="{FF2B5EF4-FFF2-40B4-BE49-F238E27FC236}">
+                  <a16:creationId xmlns:a16="http://schemas.microsoft.com/office/drawing/2014/main" id="{1DCCAC0C-CBA8-49CA-93ED-06277B0B76F2}"/>
+                </a:ext>
+              </a:extLst>
+            </p:cNvPr>
+            <p:cNvSpPr/>
+            <p:nvPr/>
+          </p:nvSpPr>
+          <p:spPr>
+            <a:xfrm>
+              <a:off x="1315773" y="5318651"/>
+              <a:ext cx="1976560" cy="315764"/>
+            </a:xfrm>
+            <a:prstGeom prst="rect">
+              <a:avLst/>
+            </a:prstGeom>
+            <a:solidFill>
+              <a:schemeClr val="bg1"/>
+            </a:solidFill>
+            <a:ln w="38100"/>
+          </p:spPr>
+          <p:style>
+            <a:lnRef idx="2">
+              <a:schemeClr val="accent3">
+                <a:shade val="50000"/>
+              </a:schemeClr>
+            </a:lnRef>
+            <a:fillRef idx="1">
+              <a:schemeClr val="accent3"/>
+            </a:fillRef>
+            <a:effectRef idx="0">
+              <a:schemeClr val="accent3"/>
+            </a:effectRef>
+            <a:fontRef idx="minor">
+              <a:schemeClr val="lt1"/>
+            </a:fontRef>
+          </p:style>
+          <p:txBody>
+            <a:bodyPr rtlCol="0" anchor="ctr"/>
+            <a:lstStyle/>
+            <a:p>
+              <a:pPr algn="ctr"/>
+              <a:r>
+                <a:rPr lang="en-US" sz="1400" dirty="0">
+                  <a:solidFill>
+                    <a:schemeClr val="tx1"/>
+                  </a:solidFill>
+                  <a:latin typeface="Gotham" panose="02000303000000000000" pitchFamily="50" charset="0"/>
+                </a:rPr>
+                <a:t>Warehouse Cost</a:t>
+              </a:r>
+              <a:endParaRPr lang="en-MY" sz="1400" dirty="0">
+                <a:solidFill>
+                  <a:schemeClr val="tx1"/>
+                </a:solidFill>
+                <a:latin typeface="Gotham" panose="02000303000000000000" pitchFamily="50" charset="0"/>
+              </a:endParaRPr>
+            </a:p>
+          </p:txBody>
+        </p:sp>
+        <p:sp>
+          <p:nvSpPr>
+            <p:cNvPr id="41" name="Rectangle 40">
+              <a:extLst>
+                <a:ext uri="{FF2B5EF4-FFF2-40B4-BE49-F238E27FC236}">
+                  <a16:creationId xmlns:a16="http://schemas.microsoft.com/office/drawing/2014/main" id="{7ABAB5A5-ECFB-473D-B7F0-9BBCEC931317}"/>
+                </a:ext>
+              </a:extLst>
+            </p:cNvPr>
+            <p:cNvSpPr/>
+            <p:nvPr/>
+          </p:nvSpPr>
+          <p:spPr>
+            <a:xfrm>
+              <a:off x="1133750" y="3036878"/>
+              <a:ext cx="1976560" cy="315764"/>
+            </a:xfrm>
+            <a:prstGeom prst="rect">
+              <a:avLst/>
+            </a:prstGeom>
+            <a:ln/>
+          </p:spPr>
+          <p:style>
+            <a:lnRef idx="2">
+              <a:schemeClr val="accent3">
+                <a:shade val="50000"/>
+              </a:schemeClr>
+            </a:lnRef>
+            <a:fillRef idx="1">
+              <a:schemeClr val="accent3"/>
+            </a:fillRef>
+            <a:effectRef idx="0">
+              <a:schemeClr val="accent3"/>
+            </a:effectRef>
+            <a:fontRef idx="minor">
+              <a:schemeClr val="lt1"/>
+            </a:fontRef>
+          </p:style>
+          <p:txBody>
+            <a:bodyPr rtlCol="0" anchor="ctr"/>
+            <a:lstStyle/>
+            <a:p>
+              <a:pPr algn="ctr"/>
+              <a:r>
+                <a:rPr lang="en-US" sz="1400" dirty="0">
+                  <a:solidFill>
+                    <a:schemeClr val="bg1"/>
+                  </a:solidFill>
+                  <a:latin typeface="Gotham" panose="02000303000000000000" pitchFamily="50" charset="0"/>
+                </a:rPr>
+                <a:t>Order List</a:t>
+              </a:r>
+              <a:endParaRPr lang="en-MY" sz="1400" dirty="0">
+                <a:solidFill>
+                  <a:schemeClr val="bg1"/>
+                </a:solidFill>
+                <a:latin typeface="Gotham" panose="02000303000000000000" pitchFamily="50" charset="0"/>
+              </a:endParaRPr>
+            </a:p>
+          </p:txBody>
+        </p:sp>
+        <p:sp>
+          <p:nvSpPr>
+            <p:cNvPr id="40" name="Rectangle 39">
+              <a:extLst>
+                <a:ext uri="{FF2B5EF4-FFF2-40B4-BE49-F238E27FC236}">
+                  <a16:creationId xmlns:a16="http://schemas.microsoft.com/office/drawing/2014/main" id="{05691B72-9677-48C5-BE29-DD5972857A1A}"/>
+                </a:ext>
+              </a:extLst>
+            </p:cNvPr>
+            <p:cNvSpPr/>
+            <p:nvPr/>
+          </p:nvSpPr>
+          <p:spPr>
+            <a:xfrm>
+              <a:off x="2509666" y="5961834"/>
+              <a:ext cx="1473565" cy="315764"/>
+            </a:xfrm>
+            <a:prstGeom prst="rect">
+              <a:avLst/>
+            </a:prstGeom>
+            <a:solidFill>
+              <a:schemeClr val="bg1"/>
+            </a:solidFill>
+            <a:ln w="38100"/>
+          </p:spPr>
+          <p:style>
+            <a:lnRef idx="2">
+              <a:schemeClr val="accent3">
+                <a:shade val="50000"/>
+              </a:schemeClr>
+            </a:lnRef>
+            <a:fillRef idx="1">
+              <a:schemeClr val="accent3"/>
+            </a:fillRef>
+            <a:effectRef idx="0">
+              <a:schemeClr val="accent3"/>
+            </a:effectRef>
+            <a:fontRef idx="minor">
+              <a:schemeClr val="lt1"/>
+            </a:fontRef>
+          </p:style>
+          <p:txBody>
+            <a:bodyPr rtlCol="0" anchor="ctr"/>
+            <a:lstStyle/>
+            <a:p>
+              <a:pPr algn="ctr"/>
+              <a:r>
+                <a:rPr lang="en-US" sz="1400" dirty="0">
+                  <a:solidFill>
+                    <a:schemeClr val="tx1"/>
+                  </a:solidFill>
+                  <a:latin typeface="Gotham" panose="02000303000000000000" pitchFamily="50" charset="0"/>
+                </a:rPr>
+                <a:t>Known</a:t>
+              </a:r>
+              <a:endParaRPr lang="en-MY" sz="1400" dirty="0">
+                <a:solidFill>
+                  <a:schemeClr val="tx1"/>
+                </a:solidFill>
+                <a:latin typeface="Gotham" panose="02000303000000000000" pitchFamily="50" charset="0"/>
+              </a:endParaRPr>
+            </a:p>
+          </p:txBody>
+        </p:sp>
+        <p:sp>
+          <p:nvSpPr>
+            <p:cNvPr id="43" name="Rectangle: Rounded Corners 42">
+              <a:extLst>
+                <a:ext uri="{FF2B5EF4-FFF2-40B4-BE49-F238E27FC236}">
+                  <a16:creationId xmlns:a16="http://schemas.microsoft.com/office/drawing/2014/main" id="{8C931CD2-2E3C-4060-84C8-934EF7154D52}"/>
+                </a:ext>
+              </a:extLst>
+            </p:cNvPr>
+            <p:cNvSpPr/>
+            <p:nvPr/>
+          </p:nvSpPr>
+          <p:spPr>
+            <a:xfrm>
+              <a:off x="894665" y="5963723"/>
+              <a:ext cx="1473565" cy="315764"/>
+            </a:xfrm>
+            <a:prstGeom prst="roundRect">
+              <a:avLst/>
+            </a:prstGeom>
+            <a:solidFill>
+              <a:schemeClr val="bg1"/>
+            </a:solidFill>
+            <a:ln w="38100"/>
+          </p:spPr>
+          <p:style>
+            <a:lnRef idx="2">
+              <a:schemeClr val="accent6">
+                <a:shade val="50000"/>
+              </a:schemeClr>
+            </a:lnRef>
+            <a:fillRef idx="1">
+              <a:schemeClr val="accent6"/>
+            </a:fillRef>
+            <a:effectRef idx="0">
+              <a:schemeClr val="accent6"/>
+            </a:effectRef>
+            <a:fontRef idx="minor">
+              <a:schemeClr val="lt1"/>
+            </a:fontRef>
+          </p:style>
+          <p:txBody>
+            <a:bodyPr rtlCol="0" anchor="ctr"/>
+            <a:lstStyle/>
+            <a:p>
+              <a:pPr algn="ctr"/>
+              <a:r>
+                <a:rPr lang="en-US" sz="1400" dirty="0">
+                  <a:solidFill>
+                    <a:schemeClr val="tx1"/>
+                  </a:solidFill>
+                  <a:latin typeface="Gotham" panose="02000303000000000000" pitchFamily="50" charset="0"/>
+                </a:rPr>
+                <a:t>Variables</a:t>
+              </a:r>
+              <a:endParaRPr lang="en-MY" sz="1400" dirty="0">
+                <a:solidFill>
+                  <a:schemeClr val="tx1"/>
+                </a:solidFill>
+                <a:latin typeface="Gotham" panose="02000303000000000000" pitchFamily="50" charset="0"/>
+              </a:endParaRPr>
+            </a:p>
+          </p:txBody>
+        </p:sp>
+        <p:sp>
+          <p:nvSpPr>
+            <p:cNvPr id="45" name="Rectangle 44">
+              <a:extLst>
+                <a:ext uri="{FF2B5EF4-FFF2-40B4-BE49-F238E27FC236}">
+                  <a16:creationId xmlns:a16="http://schemas.microsoft.com/office/drawing/2014/main" id="{58F37681-2DE1-4FA1-9C36-2676C646C947}"/>
+                </a:ext>
+              </a:extLst>
+            </p:cNvPr>
+            <p:cNvSpPr/>
+            <p:nvPr/>
+          </p:nvSpPr>
+          <p:spPr>
+            <a:xfrm>
+              <a:off x="4124667" y="5958733"/>
+              <a:ext cx="1473565" cy="315764"/>
+            </a:xfrm>
+            <a:prstGeom prst="rect">
+              <a:avLst/>
+            </a:prstGeom>
+            <a:ln/>
+          </p:spPr>
+          <p:style>
+            <a:lnRef idx="2">
+              <a:schemeClr val="accent3">
+                <a:shade val="50000"/>
+              </a:schemeClr>
+            </a:lnRef>
+            <a:fillRef idx="1">
+              <a:schemeClr val="accent3"/>
+            </a:fillRef>
+            <a:effectRef idx="0">
+              <a:schemeClr val="accent3"/>
+            </a:effectRef>
+            <a:fontRef idx="minor">
+              <a:schemeClr val="lt1"/>
+            </a:fontRef>
+          </p:style>
+          <p:txBody>
+            <a:bodyPr rtlCol="0" anchor="ctr"/>
+            <a:lstStyle/>
+            <a:p>
+              <a:pPr algn="ctr"/>
+              <a:r>
+                <a:rPr lang="en-US" sz="1400" dirty="0">
+                  <a:solidFill>
+                    <a:schemeClr val="bg1"/>
+                  </a:solidFill>
+                  <a:latin typeface="Gotham" panose="02000303000000000000" pitchFamily="50" charset="0"/>
+                </a:rPr>
+                <a:t>Unknown</a:t>
+              </a:r>
+              <a:endParaRPr lang="en-MY" sz="1400" dirty="0">
+                <a:solidFill>
+                  <a:schemeClr val="bg1"/>
+                </a:solidFill>
+                <a:latin typeface="Gotham" panose="02000303000000000000" pitchFamily="50" charset="0"/>
+              </a:endParaRPr>
+            </a:p>
+          </p:txBody>
+        </p:sp>
+      </p:grpSp>
+    </p:spTree>
+    <p:extLst>
+      <p:ext uri="{BB962C8B-B14F-4D97-AF65-F5344CB8AC3E}">
+        <p14:creationId xmlns:p14="http://schemas.microsoft.com/office/powerpoint/2010/main" val="1296841027"/>
+      </p:ext>
+    </p:extLst>
+  </p:cSld>
+  <p:clrMapOvr>
+    <a:masterClrMapping/>
+  </p:clrMapOvr>
+</p:sld>
+</file>
+
+<file path=ppt/slides/slide2.xml><?xml version="1.0" encoding="utf-8"?>
+<p:sld xmlns:a="http://schemas.openxmlformats.org/drawingml/2006/main" xmlns:r="http://schemas.openxmlformats.org/officeDocument/2006/relationships" xmlns:p="http://schemas.openxmlformats.org/presentationml/2006/main">
+  <p:cSld>
+    <p:spTree>
+      <p:nvGrpSpPr>
+        <p:cNvPr id="1" name=""/>
+        <p:cNvGrpSpPr/>
+        <p:nvPr/>
+      </p:nvGrpSpPr>
+      <p:grpSpPr>
+        <a:xfrm>
+          <a:off x="0" y="0"/>
+          <a:ext cx="0" cy="0"/>
+          <a:chOff x="0" y="0"/>
+          <a:chExt cx="0" cy="0"/>
+        </a:xfrm>
+      </p:grpSpPr>
       <p:sp>
         <p:nvSpPr>
           <p:cNvPr id="4" name="Rectangle 3">
@@ -5167,7 +7326,7 @@
     </p:spTree>
     <p:extLst>
       <p:ext uri="{BB962C8B-B14F-4D97-AF65-F5344CB8AC3E}">
-        <p14:creationId xmlns:p14="http://schemas.microsoft.com/office/powerpoint/2010/main" val="1296841027"/>
+        <p14:creationId xmlns:p14="http://schemas.microsoft.com/office/powerpoint/2010/main" val="3818188229"/>
       </p:ext>
     </p:extLst>
   </p:cSld>

</xml_diff>